<commit_message>
some comments for presentation
</commit_message>
<xml_diff>
--- a/Docker.pptx
+++ b/Docker.pptx
@@ -5472,11 +5472,11 @@
   <p:clrMapOvr>
     <a:masterClrMapping/>
   </p:clrMapOvr>
-  <mc:AlternateContent xmlns:mc="http://schemas.openxmlformats.org/markup-compatibility/2006">
-    <mc:Choice xmlns:p14="http://schemas.microsoft.com/office/powerpoint/2010/main" Requires="p14">
+  <mc:AlternateContent xmlns:mc="http://schemas.openxmlformats.org/markup-compatibility/2006" xmlns:p14="http://schemas.microsoft.com/office/powerpoint/2010/main">
+    <mc:Choice Requires="p14">
       <p:transition p14:dur="10"/>
     </mc:Choice>
-    <mc:Fallback>
+    <mc:Fallback xmlns="">
       <p:transition/>
     </mc:Fallback>
   </mc:AlternateContent>
@@ -6463,19 +6463,6 @@
               </a:rPr>
               <a:t>1</a:t>
             </a:r>
-            <a:endParaRPr lang="fr-FR" sz="4400" b="1" dirty="0">
-              <a:ln w="12700">
-                <a:solidFill>
-                  <a:srgbClr val="0066FF"/>
-                </a:solidFill>
-                <a:prstDash val="solid"/>
-              </a:ln>
-              <a:effectLst>
-                <a:outerShdw dist="38100" dir="2640000" algn="bl" rotWithShape="0">
-                  <a:schemeClr val="accent1"/>
-                </a:outerShdw>
-              </a:effectLst>
-            </a:endParaRPr>
           </a:p>
         </p:txBody>
       </p:sp>
@@ -6697,19 +6684,6 @@
               </a:rPr>
               <a:t>4</a:t>
             </a:r>
-            <a:endParaRPr lang="fr-FR" sz="4400" b="1" dirty="0">
-              <a:ln w="12700">
-                <a:solidFill>
-                  <a:srgbClr val="0066FF"/>
-                </a:solidFill>
-                <a:prstDash val="solid"/>
-              </a:ln>
-              <a:effectLst>
-                <a:outerShdw dist="38100" dir="2640000" algn="bl" rotWithShape="0">
-                  <a:schemeClr val="accent1"/>
-                </a:outerShdw>
-              </a:effectLst>
-            </a:endParaRPr>
           </a:p>
         </p:txBody>
       </p:sp>
@@ -7853,6 +7827,34 @@
           </a:p>
         </p:txBody>
       </p:sp>
+      <p:sp>
+        <p:nvSpPr>
+          <p:cNvPr id="2" name="Rectangle 1"/>
+          <p:cNvSpPr/>
+          <p:nvPr/>
+        </p:nvSpPr>
+        <p:spPr>
+          <a:xfrm>
+            <a:off x="4530437" y="4911437"/>
+            <a:ext cx="6096000" cy="646331"/>
+          </a:xfrm>
+          <a:prstGeom prst="rect">
+            <a:avLst/>
+          </a:prstGeom>
+        </p:spPr>
+        <p:txBody>
+          <a:bodyPr>
+            <a:spAutoFit/>
+          </a:bodyPr>
+          <a:lstStyle/>
+          <a:p>
+            <a:r>
+              <a:rPr lang="fr-FR" dirty="0"/>
+              <a:t>une attaque est plus facile de se propager sur des conteneurs car celles-ci partagent les mêmes ressources</a:t>
+            </a:r>
+          </a:p>
+        </p:txBody>
+      </p:sp>
     </p:spTree>
     <p:extLst>
       <p:ext uri="{BB962C8B-B14F-4D97-AF65-F5344CB8AC3E}">
@@ -8169,6 +8171,109 @@
                                         </p:tgtEl>
                                       </p:cBhvr>
                                     </p:animEffect>
+                                  </p:childTnLst>
+                                </p:cTn>
+                              </p:par>
+                            </p:childTnLst>
+                          </p:cTn>
+                        </p:par>
+                      </p:childTnLst>
+                    </p:cTn>
+                  </p:par>
+                  <p:par>
+                    <p:cTn id="30" fill="hold">
+                      <p:stCondLst>
+                        <p:cond delay="indefinite"/>
+                      </p:stCondLst>
+                      <p:childTnLst>
+                        <p:par>
+                          <p:cTn id="31" fill="hold">
+                            <p:stCondLst>
+                              <p:cond delay="0"/>
+                            </p:stCondLst>
+                            <p:childTnLst>
+                              <p:par>
+                                <p:cTn id="32" presetID="2" presetClass="entr" presetSubtype="4" fill="hold" nodeType="clickEffect">
+                                  <p:stCondLst>
+                                    <p:cond delay="0"/>
+                                  </p:stCondLst>
+                                  <p:childTnLst>
+                                    <p:set>
+                                      <p:cBhvr>
+                                        <p:cTn id="33" dur="1" fill="hold">
+                                          <p:stCondLst>
+                                            <p:cond delay="0"/>
+                                          </p:stCondLst>
+                                        </p:cTn>
+                                        <p:tgtEl>
+                                          <p:spTgt spid="2">
+                                            <p:txEl>
+                                              <p:pRg st="0" end="0"/>
+                                            </p:txEl>
+                                          </p:spTgt>
+                                        </p:tgtEl>
+                                        <p:attrNameLst>
+                                          <p:attrName>style.visibility</p:attrName>
+                                        </p:attrNameLst>
+                                      </p:cBhvr>
+                                      <p:to>
+                                        <p:strVal val="visible"/>
+                                      </p:to>
+                                    </p:set>
+                                    <p:anim calcmode="lin" valueType="num">
+                                      <p:cBhvr additive="base">
+                                        <p:cTn id="34" dur="500" fill="hold"/>
+                                        <p:tgtEl>
+                                          <p:spTgt spid="2">
+                                            <p:txEl>
+                                              <p:pRg st="0" end="0"/>
+                                            </p:txEl>
+                                          </p:spTgt>
+                                        </p:tgtEl>
+                                        <p:attrNameLst>
+                                          <p:attrName>ppt_x</p:attrName>
+                                        </p:attrNameLst>
+                                      </p:cBhvr>
+                                      <p:tavLst>
+                                        <p:tav tm="0">
+                                          <p:val>
+                                            <p:strVal val="#ppt_x"/>
+                                          </p:val>
+                                        </p:tav>
+                                        <p:tav tm="100000">
+                                          <p:val>
+                                            <p:strVal val="#ppt_x"/>
+                                          </p:val>
+                                        </p:tav>
+                                      </p:tavLst>
+                                    </p:anim>
+                                    <p:anim calcmode="lin" valueType="num">
+                                      <p:cBhvr additive="base">
+                                        <p:cTn id="35" dur="500" fill="hold"/>
+                                        <p:tgtEl>
+                                          <p:spTgt spid="2">
+                                            <p:txEl>
+                                              <p:pRg st="0" end="0"/>
+                                            </p:txEl>
+                                          </p:spTgt>
+                                        </p:tgtEl>
+                                        <p:attrNameLst>
+                                          <p:attrName>ppt_y</p:attrName>
+                                        </p:attrNameLst>
+                                      </p:cBhvr>
+                                      <p:tavLst>
+                                        <p:tav tm="0">
+                                          <p:val>
+                                            <p:strVal val="1+#ppt_h/2"/>
+                                          </p:val>
+                                        </p:tav>
+                                        <p:tav tm="100000">
+                                          <p:val>
+                                            <p:strVal val="#ppt_y"/>
+                                          </p:val>
+                                        </p:tav>
+                                      </p:tavLst>
+                                    </p:anim>
                                   </p:childTnLst>
                                 </p:cTn>
                               </p:par>

</xml_diff>